<commit_message>
What else could it be, more work on the presentation.
</commit_message>
<xml_diff>
--- a/Presentation/Presentation.pptx
+++ b/Presentation/Presentation.pptx
@@ -10,24 +10,25 @@
     <p:sldMasterId id="2147483697" r:id="rId6"/>
   </p:sldMasterIdLst>
   <p:notesMasterIdLst>
-    <p:notesMasterId r:id="rId19"/>
+    <p:notesMasterId r:id="rId20"/>
   </p:notesMasterIdLst>
   <p:handoutMasterIdLst>
-    <p:handoutMasterId r:id="rId20"/>
+    <p:handoutMasterId r:id="rId21"/>
   </p:handoutMasterIdLst>
   <p:sldIdLst>
     <p:sldId id="356" r:id="rId7"/>
     <p:sldId id="369" r:id="rId8"/>
     <p:sldId id="370" r:id="rId9"/>
-    <p:sldId id="371" r:id="rId10"/>
-    <p:sldId id="374" r:id="rId11"/>
-    <p:sldId id="373" r:id="rId12"/>
-    <p:sldId id="375" r:id="rId13"/>
-    <p:sldId id="376" r:id="rId14"/>
-    <p:sldId id="378" r:id="rId15"/>
-    <p:sldId id="380" r:id="rId16"/>
-    <p:sldId id="379" r:id="rId17"/>
-    <p:sldId id="377" r:id="rId18"/>
+    <p:sldId id="381" r:id="rId10"/>
+    <p:sldId id="371" r:id="rId11"/>
+    <p:sldId id="374" r:id="rId12"/>
+    <p:sldId id="373" r:id="rId13"/>
+    <p:sldId id="375" r:id="rId14"/>
+    <p:sldId id="376" r:id="rId15"/>
+    <p:sldId id="378" r:id="rId16"/>
+    <p:sldId id="380" r:id="rId17"/>
+    <p:sldId id="379" r:id="rId18"/>
+    <p:sldId id="377" r:id="rId19"/>
   </p:sldIdLst>
   <p:sldSz cx="9144000" cy="6858000" type="screen4x3"/>
   <p:notesSz cx="9925050" cy="6665913"/>
@@ -298,7 +299,7 @@
               <a:pPr>
                 <a:defRPr/>
               </a:pPr>
-              <a:t>16/10/2024</a:t>
+              <a:t>18/10/2024</a:t>
             </a:fld>
             <a:endParaRPr lang="en-GB" dirty="0"/>
           </a:p>
@@ -517,7 +518,7 @@
               <a:pPr>
                 <a:defRPr/>
               </a:pPr>
-              <a:t>16/10/2024</a:t>
+              <a:t>18/10/2024</a:t>
             </a:fld>
             <a:endParaRPr lang="en-GB"/>
           </a:p>
@@ -9081,6 +9082,214 @@
         <p:cNvPr id="1" name="">
           <a:extLst>
             <a:ext uri="{FF2B5EF4-FFF2-40B4-BE49-F238E27FC236}">
+              <a16:creationId xmlns:a16="http://schemas.microsoft.com/office/drawing/2014/main" id="{C574AF84-52E5-5394-2681-C8DEF2DE95B6}"/>
+            </a:ext>
+          </a:extLst>
+        </p:cNvPr>
+        <p:cNvGrpSpPr/>
+        <p:nvPr/>
+      </p:nvGrpSpPr>
+      <p:grpSpPr>
+        <a:xfrm>
+          <a:off x="0" y="0"/>
+          <a:ext cx="0" cy="0"/>
+          <a:chOff x="0" y="0"/>
+          <a:chExt cx="0" cy="0"/>
+        </a:xfrm>
+      </p:grpSpPr>
+      <p:sp>
+        <p:nvSpPr>
+          <p:cNvPr id="2" name="Inhaltsplatzhalter 1">
+            <a:extLst>
+              <a:ext uri="{FF2B5EF4-FFF2-40B4-BE49-F238E27FC236}">
+                <a16:creationId xmlns:a16="http://schemas.microsoft.com/office/drawing/2014/main" id="{7E3BBF59-C789-5A56-19E6-7F4CE7EF5D9D}"/>
+              </a:ext>
+            </a:extLst>
+          </p:cNvPr>
+          <p:cNvSpPr>
+            <a:spLocks noGrp="1"/>
+          </p:cNvSpPr>
+          <p:nvPr>
+            <p:ph idx="1"/>
+          </p:nvPr>
+        </p:nvSpPr>
+        <p:spPr/>
+        <p:txBody>
+          <a:bodyPr/>
+          <a:lstStyle/>
+          <a:p>
+            <a:pPr marL="285750" indent="-285750">
+              <a:buFont typeface="Arial" panose="020B0604020202020204" pitchFamily="34" charset="0"/>
+              <a:buChar char="•"/>
+            </a:pPr>
+            <a:r>
+              <a:rPr lang="en-US" dirty="0"/>
+              <a:t>In Theory: All requirements fulfilled</a:t>
+            </a:r>
+          </a:p>
+          <a:p>
+            <a:pPr marL="646113" lvl="2" indent="-285750">
+              <a:buFont typeface="Arial" panose="020B0604020202020204" pitchFamily="34" charset="0"/>
+              <a:buChar char="•"/>
+            </a:pPr>
+            <a:r>
+              <a:rPr lang="en-US" dirty="0"/>
+              <a:t>Solution is deterministic, fast enough for real-time queries</a:t>
+            </a:r>
+          </a:p>
+          <a:p>
+            <a:pPr marL="646113" lvl="2" indent="-285750">
+              <a:buFont typeface="Arial" panose="020B0604020202020204" pitchFamily="34" charset="0"/>
+              <a:buChar char="•"/>
+            </a:pPr>
+            <a:r>
+              <a:rPr lang="en-US" dirty="0"/>
+              <a:t>Every anchor owns an anchor that extends as far as possible and is fully enclosed</a:t>
+            </a:r>
+          </a:p>
+          <a:p>
+            <a:pPr marL="285750" indent="-285750">
+              <a:buFont typeface="Arial" panose="020B0604020202020204" pitchFamily="34" charset="0"/>
+              <a:buChar char="•"/>
+            </a:pPr>
+            <a:r>
+              <a:rPr lang="en-US" dirty="0"/>
+              <a:t>In Practice: Implementation supplied is incomplete</a:t>
+            </a:r>
+          </a:p>
+          <a:p>
+            <a:pPr marL="646113" lvl="2" indent="-285750">
+              <a:buFont typeface="Arial" panose="020B0604020202020204" pitchFamily="34" charset="0"/>
+              <a:buChar char="•"/>
+            </a:pPr>
+            <a:r>
+              <a:rPr lang="en-US" dirty="0"/>
+              <a:t>Instability due to Floating Point Imprecision (Gaps in volumes)</a:t>
+            </a:r>
+          </a:p>
+          <a:p>
+            <a:pPr marL="646113" lvl="2" indent="-285750">
+              <a:buFont typeface="Arial" panose="020B0604020202020204" pitchFamily="34" charset="0"/>
+              <a:buChar char="•"/>
+            </a:pPr>
+            <a:r>
+              <a:rPr lang="en-US" dirty="0"/>
+              <a:t>Handling of invalid input</a:t>
+            </a:r>
+          </a:p>
+        </p:txBody>
+      </p:sp>
+      <p:sp>
+        <p:nvSpPr>
+          <p:cNvPr id="4" name="Foliennummernplatzhalter 3">
+            <a:extLst>
+              <a:ext uri="{FF2B5EF4-FFF2-40B4-BE49-F238E27FC236}">
+                <a16:creationId xmlns:a16="http://schemas.microsoft.com/office/drawing/2014/main" id="{27C63248-5AEB-CA45-2E98-07F1492F6B1D}"/>
+              </a:ext>
+            </a:extLst>
+          </p:cNvPr>
+          <p:cNvSpPr>
+            <a:spLocks noGrp="1"/>
+          </p:cNvSpPr>
+          <p:nvPr>
+            <p:ph type="sldNum" sz="quarter" idx="11"/>
+          </p:nvPr>
+        </p:nvSpPr>
+        <p:spPr/>
+        <p:txBody>
+          <a:bodyPr/>
+          <a:lstStyle/>
+          <a:p>
+            <a:fld id="{CE58CB1E-F828-4F11-99E0-327109AF9DA4}" type="slidenum">
+              <a:rPr lang="de-DE" smtClean="0"/>
+              <a:pPr/>
+              <a:t>10</a:t>
+            </a:fld>
+            <a:endParaRPr lang="de-DE" dirty="0"/>
+          </a:p>
+        </p:txBody>
+      </p:sp>
+      <p:sp>
+        <p:nvSpPr>
+          <p:cNvPr id="7" name="Fußzeilenplatzhalter 4">
+            <a:extLst>
+              <a:ext uri="{FF2B5EF4-FFF2-40B4-BE49-F238E27FC236}">
+                <a16:creationId xmlns:a16="http://schemas.microsoft.com/office/drawing/2014/main" id="{B44BF768-3F0F-65B8-44BA-BABBD3BD8DCA}"/>
+              </a:ext>
+            </a:extLst>
+          </p:cNvPr>
+          <p:cNvSpPr>
+            <a:spLocks noGrp="1"/>
+          </p:cNvSpPr>
+          <p:nvPr>
+            <p:ph type="ftr" sz="quarter" idx="12"/>
+          </p:nvPr>
+        </p:nvSpPr>
+        <p:spPr/>
+        <p:txBody>
+          <a:bodyPr/>
+          <a:lstStyle/>
+          <a:p>
+            <a:r>
+              <a:rPr lang="en-US" dirty="0"/>
+              <a:t>Victor Matheke | Bachelor‘s Thesis | Algorithmic Subdivision of Gamespaces</a:t>
+            </a:r>
+          </a:p>
+        </p:txBody>
+      </p:sp>
+      <p:sp>
+        <p:nvSpPr>
+          <p:cNvPr id="3" name="Titel 2">
+            <a:extLst>
+              <a:ext uri="{FF2B5EF4-FFF2-40B4-BE49-F238E27FC236}">
+                <a16:creationId xmlns:a16="http://schemas.microsoft.com/office/drawing/2014/main" id="{199A23C9-3CF5-E225-D99D-3B15BD785954}"/>
+              </a:ext>
+            </a:extLst>
+          </p:cNvPr>
+          <p:cNvSpPr>
+            <a:spLocks noGrp="1"/>
+          </p:cNvSpPr>
+          <p:nvPr>
+            <p:ph type="title"/>
+          </p:nvPr>
+        </p:nvSpPr>
+        <p:spPr>
+          <a:prstGeom prst="rect">
+            <a:avLst/>
+          </a:prstGeom>
+        </p:spPr>
+        <p:txBody>
+          <a:bodyPr/>
+          <a:lstStyle/>
+          <a:p>
+            <a:r>
+              <a:rPr lang="en-US" sz="3000" dirty="0"/>
+              <a:t>Assessment</a:t>
+            </a:r>
+          </a:p>
+        </p:txBody>
+      </p:sp>
+    </p:spTree>
+    <p:extLst>
+      <p:ext uri="{BB962C8B-B14F-4D97-AF65-F5344CB8AC3E}">
+        <p14:creationId xmlns:p14="http://schemas.microsoft.com/office/powerpoint/2010/main" val="3003218205"/>
+      </p:ext>
+    </p:extLst>
+  </p:cSld>
+  <p:clrMapOvr>
+    <a:masterClrMapping/>
+  </p:clrMapOvr>
+</p:sld>
+</file>
+
+<file path=ppt/slides/slide11.xml><?xml version="1.0" encoding="utf-8"?>
+<p:sld xmlns:a="http://schemas.openxmlformats.org/drawingml/2006/main" xmlns:r="http://schemas.openxmlformats.org/officeDocument/2006/relationships" xmlns:p="http://schemas.openxmlformats.org/presentationml/2006/main">
+  <p:cSld>
+    <p:spTree>
+      <p:nvGrpSpPr>
+        <p:cNvPr id="1" name="">
+          <a:extLst>
+            <a:ext uri="{FF2B5EF4-FFF2-40B4-BE49-F238E27FC236}">
               <a16:creationId xmlns:a16="http://schemas.microsoft.com/office/drawing/2014/main" id="{EBEFCD7E-C0E6-B63E-22C7-0F21C55AB747}"/>
             </a:ext>
           </a:extLst>
@@ -9121,7 +9330,106 @@
               <a:buFont typeface="Arial" panose="020B0604020202020204" pitchFamily="34" charset="0"/>
               <a:buChar char="•"/>
             </a:pPr>
+            <a:r>
+              <a:rPr lang="en-US" dirty="0"/>
+              <a:t>Thesis by Kerstin </a:t>
+            </a:r>
+            <a:r>
+              <a:rPr lang="en-US" dirty="0" err="1"/>
+              <a:t>Pfaffinger</a:t>
+            </a:r>
+            <a:r>
+              <a:rPr lang="en-US" dirty="0"/>
+              <a:t> on the same topic</a:t>
+            </a:r>
+          </a:p>
+          <a:p>
+            <a:pPr marL="285750" indent="-285750">
+              <a:buFont typeface="Arial" panose="020B0604020202020204" pitchFamily="34" charset="0"/>
+              <a:buChar char="•"/>
+            </a:pPr>
             <a:endParaRPr lang="en-US" dirty="0"/>
+          </a:p>
+          <a:p>
+            <a:pPr marL="285750" indent="-285750">
+              <a:buFont typeface="Arial" panose="020B0604020202020204" pitchFamily="34" charset="0"/>
+              <a:buChar char="•"/>
+            </a:pPr>
+            <a:r>
+              <a:rPr lang="en-US" dirty="0" err="1"/>
+              <a:t>Pfaffinger’s</a:t>
+            </a:r>
+            <a:r>
+              <a:rPr lang="en-US" dirty="0"/>
+              <a:t> Approach: Use Marching Cubes (on Voronoi Diagram)</a:t>
+            </a:r>
+          </a:p>
+          <a:p>
+            <a:pPr marL="461963" lvl="1" indent="-285750">
+              <a:buFont typeface="Arial" panose="020B0604020202020204" pitchFamily="34" charset="0"/>
+              <a:buChar char="•"/>
+            </a:pPr>
+            <a:r>
+              <a:rPr lang="en-US" dirty="0"/>
+              <a:t>Marching Cubes has much higher error (depending on cell size)</a:t>
+            </a:r>
+          </a:p>
+          <a:p>
+            <a:pPr marL="461963" lvl="1" indent="-285750">
+              <a:buFont typeface="Arial" panose="020B0604020202020204" pitchFamily="34" charset="0"/>
+              <a:buChar char="•"/>
+            </a:pPr>
+            <a:r>
+              <a:rPr lang="en-US" dirty="0"/>
+              <a:t>Voronoi Diagram has better resolution of underspecification (here: Anchors cannot grow into each other. They can in my approach)</a:t>
+            </a:r>
+          </a:p>
+          <a:p>
+            <a:pPr marL="461963" lvl="1" indent="-285750">
+              <a:buFont typeface="Arial" panose="020B0604020202020204" pitchFamily="34" charset="0"/>
+              <a:buChar char="•"/>
+            </a:pPr>
+            <a:r>
+              <a:rPr lang="en-US" dirty="0"/>
+              <a:t>Marching Cubes is much faster</a:t>
+            </a:r>
+          </a:p>
+          <a:p>
+            <a:pPr marL="461963" lvl="1" indent="-285750">
+              <a:buFont typeface="Arial" panose="020B0604020202020204" pitchFamily="34" charset="0"/>
+              <a:buChar char="•"/>
+            </a:pPr>
+            <a:endParaRPr lang="en-US" dirty="0"/>
+          </a:p>
+          <a:p>
+            <a:pPr marL="285750" indent="-285750">
+              <a:buFont typeface="Arial" panose="020B0604020202020204" pitchFamily="34" charset="0"/>
+              <a:buChar char="•"/>
+            </a:pPr>
+            <a:r>
+              <a:rPr lang="en-US" dirty="0"/>
+              <a:t>Better approach depends on use case</a:t>
+            </a:r>
+          </a:p>
+          <a:p>
+            <a:pPr marL="461963" lvl="1" indent="-285750">
+              <a:buFont typeface="Arial" panose="020B0604020202020204" pitchFamily="34" charset="0"/>
+              <a:buChar char="•"/>
+            </a:pPr>
+            <a:r>
+              <a:rPr lang="en-US" dirty="0"/>
+              <a:t>Highly dynamic and/or low-poly games may use Marching Cubes</a:t>
+            </a:r>
+          </a:p>
+          <a:p>
+            <a:pPr marL="461963" lvl="1" indent="-285750">
+              <a:buFont typeface="Arial" panose="020B0604020202020204" pitchFamily="34" charset="0"/>
+              <a:buChar char="•"/>
+            </a:pPr>
+            <a:r>
+              <a:rPr lang="en-US" dirty="0"/>
+              <a:t>Static games and/or high precision software my prefer my approach</a:t>
+            </a:r>
           </a:p>
         </p:txBody>
       </p:sp>
@@ -9149,7 +9457,7 @@
             <a:fld id="{CE58CB1E-F828-4F11-99E0-327109AF9DA4}" type="slidenum">
               <a:rPr lang="de-DE" smtClean="0"/>
               <a:pPr/>
-              <a:t>10</a:t>
+              <a:t>11</a:t>
             </a:fld>
             <a:endParaRPr lang="de-DE" dirty="0"/>
           </a:p>
@@ -9228,7 +9536,7 @@
 </p:sld>
 </file>
 
-<file path=ppt/slides/slide11.xml><?xml version="1.0" encoding="utf-8"?>
+<file path=ppt/slides/slide12.xml><?xml version="1.0" encoding="utf-8"?>
 <p:sld xmlns:a="http://schemas.openxmlformats.org/drawingml/2006/main" xmlns:r="http://schemas.openxmlformats.org/officeDocument/2006/relationships" xmlns:p="http://schemas.openxmlformats.org/presentationml/2006/main">
   <p:cSld>
     <p:spTree>
@@ -9337,7 +9645,7 @@
             <a:fld id="{CE58CB1E-F828-4F11-99E0-327109AF9DA4}" type="slidenum">
               <a:rPr lang="de-DE" smtClean="0"/>
               <a:pPr/>
-              <a:t>11</a:t>
+              <a:t>12</a:t>
             </a:fld>
             <a:endParaRPr lang="de-DE" dirty="0"/>
           </a:p>
@@ -9416,7 +9724,7 @@
 </p:sld>
 </file>
 
-<file path=ppt/slides/slide12.xml><?xml version="1.0" encoding="utf-8"?>
+<file path=ppt/slides/slide13.xml><?xml version="1.0" encoding="utf-8"?>
 <p:sld xmlns:a="http://schemas.openxmlformats.org/drawingml/2006/main" xmlns:r="http://schemas.openxmlformats.org/officeDocument/2006/relationships" xmlns:p="http://schemas.openxmlformats.org/presentationml/2006/main">
   <p:cSld>
     <p:spTree>
@@ -9604,7 +9912,7 @@
             <a:fld id="{CE58CB1E-F828-4F11-99E0-327109AF9DA4}" type="slidenum">
               <a:rPr lang="de-DE" smtClean="0"/>
               <a:pPr/>
-              <a:t>12</a:t>
+              <a:t>13</a:t>
             </a:fld>
             <a:endParaRPr lang="de-DE" dirty="0"/>
           </a:p>
@@ -10192,6 +10500,195 @@
         <p:cNvPr id="1" name="">
           <a:extLst>
             <a:ext uri="{FF2B5EF4-FFF2-40B4-BE49-F238E27FC236}">
+              <a16:creationId xmlns:a16="http://schemas.microsoft.com/office/drawing/2014/main" id="{0DB650F7-360E-785F-10E6-178E49ABA421}"/>
+            </a:ext>
+          </a:extLst>
+        </p:cNvPr>
+        <p:cNvGrpSpPr/>
+        <p:nvPr/>
+      </p:nvGrpSpPr>
+      <p:grpSpPr>
+        <a:xfrm>
+          <a:off x="0" y="0"/>
+          <a:ext cx="0" cy="0"/>
+          <a:chOff x="0" y="0"/>
+          <a:chExt cx="0" cy="0"/>
+        </a:xfrm>
+      </p:grpSpPr>
+      <p:sp>
+        <p:nvSpPr>
+          <p:cNvPr id="2" name="Inhaltsplatzhalter 1">
+            <a:extLst>
+              <a:ext uri="{FF2B5EF4-FFF2-40B4-BE49-F238E27FC236}">
+                <a16:creationId xmlns:a16="http://schemas.microsoft.com/office/drawing/2014/main" id="{BAA99566-7773-9F69-E41C-C06371165099}"/>
+              </a:ext>
+            </a:extLst>
+          </p:cNvPr>
+          <p:cNvSpPr>
+            <a:spLocks noGrp="1"/>
+          </p:cNvSpPr>
+          <p:nvPr>
+            <p:ph idx="1"/>
+          </p:nvPr>
+        </p:nvSpPr>
+        <p:spPr/>
+        <p:txBody>
+          <a:bodyPr/>
+          <a:lstStyle/>
+          <a:p>
+            <a:pPr marL="285750" indent="-285750">
+              <a:buFont typeface="Arial" panose="020B0604020202020204" pitchFamily="34" charset="0"/>
+              <a:buChar char="•"/>
+            </a:pPr>
+            <a:r>
+              <a:rPr lang="en-US" dirty="0"/>
+              <a:t>Mapping should have lowest possible error</a:t>
+            </a:r>
+          </a:p>
+          <a:p>
+            <a:pPr marL="461963" lvl="1" indent="-285750">
+              <a:buFont typeface="Arial" panose="020B0604020202020204" pitchFamily="34" charset="0"/>
+              <a:buChar char="•"/>
+            </a:pPr>
+            <a:r>
+              <a:rPr lang="en-US" dirty="0"/>
+              <a:t>Error: Discrepancy between the ideal, expected result and the calculated output</a:t>
+            </a:r>
+          </a:p>
+          <a:p>
+            <a:pPr marL="285750" indent="-285750">
+              <a:buFont typeface="Arial" panose="020B0604020202020204" pitchFamily="34" charset="0"/>
+              <a:buChar char="•"/>
+            </a:pPr>
+            <a:r>
+              <a:rPr lang="en-US" dirty="0"/>
+              <a:t>The generated mapping must be predictable for practicality</a:t>
+            </a:r>
+          </a:p>
+          <a:p>
+            <a:pPr marL="285750" indent="-285750">
+              <a:buFont typeface="Arial" panose="020B0604020202020204" pitchFamily="34" charset="0"/>
+              <a:buChar char="•"/>
+            </a:pPr>
+            <a:r>
+              <a:rPr lang="en-US" dirty="0"/>
+              <a:t>Querying of the mapping must be possible in real-time for games</a:t>
+            </a:r>
+          </a:p>
+        </p:txBody>
+      </p:sp>
+      <p:sp>
+        <p:nvSpPr>
+          <p:cNvPr id="4" name="Foliennummernplatzhalter 3">
+            <a:extLst>
+              <a:ext uri="{FF2B5EF4-FFF2-40B4-BE49-F238E27FC236}">
+                <a16:creationId xmlns:a16="http://schemas.microsoft.com/office/drawing/2014/main" id="{075E0F98-36BF-C9A9-1567-C9E1BBA858CA}"/>
+              </a:ext>
+            </a:extLst>
+          </p:cNvPr>
+          <p:cNvSpPr>
+            <a:spLocks noGrp="1"/>
+          </p:cNvSpPr>
+          <p:nvPr>
+            <p:ph type="sldNum" sz="quarter" idx="11"/>
+          </p:nvPr>
+        </p:nvSpPr>
+        <p:spPr/>
+        <p:txBody>
+          <a:bodyPr/>
+          <a:lstStyle/>
+          <a:p>
+            <a:fld id="{CE58CB1E-F828-4F11-99E0-327109AF9DA4}" type="slidenum">
+              <a:rPr lang="de-DE" smtClean="0"/>
+              <a:pPr/>
+              <a:t>4</a:t>
+            </a:fld>
+            <a:endParaRPr lang="de-DE" dirty="0"/>
+          </a:p>
+        </p:txBody>
+      </p:sp>
+      <p:sp>
+        <p:nvSpPr>
+          <p:cNvPr id="7" name="Fußzeilenplatzhalter 4">
+            <a:extLst>
+              <a:ext uri="{FF2B5EF4-FFF2-40B4-BE49-F238E27FC236}">
+                <a16:creationId xmlns:a16="http://schemas.microsoft.com/office/drawing/2014/main" id="{02D8ABE2-7395-FD74-6DA6-5629443D4FE5}"/>
+              </a:ext>
+            </a:extLst>
+          </p:cNvPr>
+          <p:cNvSpPr>
+            <a:spLocks noGrp="1"/>
+          </p:cNvSpPr>
+          <p:nvPr>
+            <p:ph type="ftr" sz="quarter" idx="12"/>
+          </p:nvPr>
+        </p:nvSpPr>
+        <p:spPr/>
+        <p:txBody>
+          <a:bodyPr/>
+          <a:lstStyle/>
+          <a:p>
+            <a:r>
+              <a:rPr lang="en-US" dirty="0"/>
+              <a:t>Victor Matheke | Bachelor‘s Thesis | Algorithmic Subdivision of Gamespaces</a:t>
+            </a:r>
+          </a:p>
+        </p:txBody>
+      </p:sp>
+      <p:sp>
+        <p:nvSpPr>
+          <p:cNvPr id="3" name="Titel 2">
+            <a:extLst>
+              <a:ext uri="{FF2B5EF4-FFF2-40B4-BE49-F238E27FC236}">
+                <a16:creationId xmlns:a16="http://schemas.microsoft.com/office/drawing/2014/main" id="{236B403A-1638-2A9A-1FE6-4115743934D0}"/>
+              </a:ext>
+            </a:extLst>
+          </p:cNvPr>
+          <p:cNvSpPr>
+            <a:spLocks noGrp="1"/>
+          </p:cNvSpPr>
+          <p:nvPr>
+            <p:ph type="title"/>
+          </p:nvPr>
+        </p:nvSpPr>
+        <p:spPr>
+          <a:prstGeom prst="rect">
+            <a:avLst/>
+          </a:prstGeom>
+        </p:spPr>
+        <p:txBody>
+          <a:bodyPr/>
+          <a:lstStyle/>
+          <a:p>
+            <a:r>
+              <a:rPr lang="en-US" dirty="0"/>
+              <a:t>Goals</a:t>
+            </a:r>
+            <a:endParaRPr lang="en-US" sz="3000" dirty="0"/>
+          </a:p>
+        </p:txBody>
+      </p:sp>
+    </p:spTree>
+    <p:extLst>
+      <p:ext uri="{BB962C8B-B14F-4D97-AF65-F5344CB8AC3E}">
+        <p14:creationId xmlns:p14="http://schemas.microsoft.com/office/powerpoint/2010/main" val="1585445376"/>
+      </p:ext>
+    </p:extLst>
+  </p:cSld>
+  <p:clrMapOvr>
+    <a:masterClrMapping/>
+  </p:clrMapOvr>
+</p:sld>
+</file>
+
+<file path=ppt/slides/slide5.xml><?xml version="1.0" encoding="utf-8"?>
+<p:sld xmlns:a="http://schemas.openxmlformats.org/drawingml/2006/main" xmlns:r="http://schemas.openxmlformats.org/officeDocument/2006/relationships" xmlns:p="http://schemas.openxmlformats.org/presentationml/2006/main">
+  <p:cSld>
+    <p:spTree>
+      <p:nvGrpSpPr>
+        <p:cNvPr id="1" name="">
+          <a:extLst>
+            <a:ext uri="{FF2B5EF4-FFF2-40B4-BE49-F238E27FC236}">
               <a16:creationId xmlns:a16="http://schemas.microsoft.com/office/drawing/2014/main" id="{5F33845F-7488-8D81-3BD9-77C4BD6E984E}"/>
             </a:ext>
           </a:extLst>
@@ -10260,7 +10757,7 @@
             <a:fld id="{CE58CB1E-F828-4F11-99E0-327109AF9DA4}" type="slidenum">
               <a:rPr lang="de-DE" smtClean="0"/>
               <a:pPr/>
-              <a:t>4</a:t>
+              <a:t>5</a:t>
             </a:fld>
             <a:endParaRPr lang="de-DE" dirty="0"/>
           </a:p>
@@ -10339,7 +10836,7 @@
 </p:sld>
 </file>
 
-<file path=ppt/slides/slide5.xml><?xml version="1.0" encoding="utf-8"?>
+<file path=ppt/slides/slide6.xml><?xml version="1.0" encoding="utf-8"?>
 <p:sld xmlns:a="http://schemas.openxmlformats.org/drawingml/2006/main" xmlns:r="http://schemas.openxmlformats.org/officeDocument/2006/relationships" xmlns:p="http://schemas.openxmlformats.org/presentationml/2006/main">
   <p:cSld>
     <p:spTree>
@@ -10594,7 +11091,7 @@
             <a:fld id="{CE58CB1E-F828-4F11-99E0-327109AF9DA4}" type="slidenum">
               <a:rPr lang="de-DE" smtClean="0"/>
               <a:pPr/>
-              <a:t>5</a:t>
+              <a:t>6</a:t>
             </a:fld>
             <a:endParaRPr lang="de-DE" dirty="0"/>
           </a:p>
@@ -10670,7 +11167,7 @@
 </p:sld>
 </file>
 
-<file path=ppt/slides/slide6.xml><?xml version="1.0" encoding="utf-8"?>
+<file path=ppt/slides/slide7.xml><?xml version="1.0" encoding="utf-8"?>
 <p:sld xmlns:a="http://schemas.openxmlformats.org/drawingml/2006/main" xmlns:r="http://schemas.openxmlformats.org/officeDocument/2006/relationships" xmlns:p="http://schemas.openxmlformats.org/presentationml/2006/main">
   <p:cSld>
     <p:spTree>
@@ -10790,7 +11287,7 @@
             <a:fld id="{CE58CB1E-F828-4F11-99E0-327109AF9DA4}" type="slidenum">
               <a:rPr lang="de-DE" smtClean="0"/>
               <a:pPr/>
-              <a:t>6</a:t>
+              <a:t>7</a:t>
             </a:fld>
             <a:endParaRPr lang="de-DE" dirty="0"/>
           </a:p>
@@ -10899,7 +11396,7 @@
 </p:sld>
 </file>
 
-<file path=ppt/slides/slide7.xml><?xml version="1.0" encoding="utf-8"?>
+<file path=ppt/slides/slide8.xml><?xml version="1.0" encoding="utf-8"?>
 <p:sld xmlns:a="http://schemas.openxmlformats.org/drawingml/2006/main" xmlns:r="http://schemas.openxmlformats.org/officeDocument/2006/relationships" xmlns:p="http://schemas.openxmlformats.org/presentationml/2006/main">
   <p:cSld>
     <p:spTree>
@@ -11051,7 +11548,7 @@
             <a:fld id="{CE58CB1E-F828-4F11-99E0-327109AF9DA4}" type="slidenum">
               <a:rPr lang="de-DE" smtClean="0"/>
               <a:pPr/>
-              <a:t>7</a:t>
+              <a:t>8</a:t>
             </a:fld>
             <a:endParaRPr lang="de-DE" dirty="0"/>
           </a:p>
@@ -11130,7 +11627,7 @@
 </p:sld>
 </file>
 
-<file path=ppt/slides/slide8.xml><?xml version="1.0" encoding="utf-8"?>
+<file path=ppt/slides/slide9.xml><?xml version="1.0" encoding="utf-8"?>
 <p:sld xmlns:a="http://schemas.openxmlformats.org/drawingml/2006/main" xmlns:r="http://schemas.openxmlformats.org/officeDocument/2006/relationships" xmlns:p="http://schemas.openxmlformats.org/presentationml/2006/main">
   <p:cSld>
     <p:spTree>
@@ -11243,7 +11740,7 @@
             <a:fld id="{CE58CB1E-F828-4F11-99E0-327109AF9DA4}" type="slidenum">
               <a:rPr lang="de-DE" smtClean="0"/>
               <a:pPr/>
-              <a:t>8</a:t>
+              <a:t>9</a:t>
             </a:fld>
             <a:endParaRPr lang="de-DE" dirty="0"/>
           </a:p>
@@ -11313,161 +11810,6 @@
     <p:extLst>
       <p:ext uri="{BB962C8B-B14F-4D97-AF65-F5344CB8AC3E}">
         <p14:creationId xmlns:p14="http://schemas.microsoft.com/office/powerpoint/2010/main" val="2869699537"/>
-      </p:ext>
-    </p:extLst>
-  </p:cSld>
-  <p:clrMapOvr>
-    <a:masterClrMapping/>
-  </p:clrMapOvr>
-</p:sld>
-</file>
-
-<file path=ppt/slides/slide9.xml><?xml version="1.0" encoding="utf-8"?>
-<p:sld xmlns:a="http://schemas.openxmlformats.org/drawingml/2006/main" xmlns:r="http://schemas.openxmlformats.org/officeDocument/2006/relationships" xmlns:p="http://schemas.openxmlformats.org/presentationml/2006/main">
-  <p:cSld>
-    <p:spTree>
-      <p:nvGrpSpPr>
-        <p:cNvPr id="1" name="">
-          <a:extLst>
-            <a:ext uri="{FF2B5EF4-FFF2-40B4-BE49-F238E27FC236}">
-              <a16:creationId xmlns:a16="http://schemas.microsoft.com/office/drawing/2014/main" id="{C574AF84-52E5-5394-2681-C8DEF2DE95B6}"/>
-            </a:ext>
-          </a:extLst>
-        </p:cNvPr>
-        <p:cNvGrpSpPr/>
-        <p:nvPr/>
-      </p:nvGrpSpPr>
-      <p:grpSpPr>
-        <a:xfrm>
-          <a:off x="0" y="0"/>
-          <a:ext cx="0" cy="0"/>
-          <a:chOff x="0" y="0"/>
-          <a:chExt cx="0" cy="0"/>
-        </a:xfrm>
-      </p:grpSpPr>
-      <p:sp>
-        <p:nvSpPr>
-          <p:cNvPr id="2" name="Inhaltsplatzhalter 1">
-            <a:extLst>
-              <a:ext uri="{FF2B5EF4-FFF2-40B4-BE49-F238E27FC236}">
-                <a16:creationId xmlns:a16="http://schemas.microsoft.com/office/drawing/2014/main" id="{7E3BBF59-C789-5A56-19E6-7F4CE7EF5D9D}"/>
-              </a:ext>
-            </a:extLst>
-          </p:cNvPr>
-          <p:cNvSpPr>
-            <a:spLocks noGrp="1"/>
-          </p:cNvSpPr>
-          <p:nvPr>
-            <p:ph idx="1"/>
-          </p:nvPr>
-        </p:nvSpPr>
-        <p:spPr/>
-        <p:txBody>
-          <a:bodyPr/>
-          <a:lstStyle/>
-          <a:p>
-            <a:pPr marL="285750" indent="-285750">
-              <a:buFont typeface="Arial" panose="020B0604020202020204" pitchFamily="34" charset="0"/>
-              <a:buChar char="•"/>
-            </a:pPr>
-            <a:endParaRPr lang="en-US" dirty="0"/>
-          </a:p>
-        </p:txBody>
-      </p:sp>
-      <p:sp>
-        <p:nvSpPr>
-          <p:cNvPr id="4" name="Foliennummernplatzhalter 3">
-            <a:extLst>
-              <a:ext uri="{FF2B5EF4-FFF2-40B4-BE49-F238E27FC236}">
-                <a16:creationId xmlns:a16="http://schemas.microsoft.com/office/drawing/2014/main" id="{27C63248-5AEB-CA45-2E98-07F1492F6B1D}"/>
-              </a:ext>
-            </a:extLst>
-          </p:cNvPr>
-          <p:cNvSpPr>
-            <a:spLocks noGrp="1"/>
-          </p:cNvSpPr>
-          <p:nvPr>
-            <p:ph type="sldNum" sz="quarter" idx="11"/>
-          </p:nvPr>
-        </p:nvSpPr>
-        <p:spPr/>
-        <p:txBody>
-          <a:bodyPr/>
-          <a:lstStyle/>
-          <a:p>
-            <a:fld id="{CE58CB1E-F828-4F11-99E0-327109AF9DA4}" type="slidenum">
-              <a:rPr lang="de-DE" smtClean="0"/>
-              <a:pPr/>
-              <a:t>9</a:t>
-            </a:fld>
-            <a:endParaRPr lang="de-DE" dirty="0"/>
-          </a:p>
-        </p:txBody>
-      </p:sp>
-      <p:sp>
-        <p:nvSpPr>
-          <p:cNvPr id="7" name="Fußzeilenplatzhalter 4">
-            <a:extLst>
-              <a:ext uri="{FF2B5EF4-FFF2-40B4-BE49-F238E27FC236}">
-                <a16:creationId xmlns:a16="http://schemas.microsoft.com/office/drawing/2014/main" id="{B44BF768-3F0F-65B8-44BA-BABBD3BD8DCA}"/>
-              </a:ext>
-            </a:extLst>
-          </p:cNvPr>
-          <p:cNvSpPr>
-            <a:spLocks noGrp="1"/>
-          </p:cNvSpPr>
-          <p:nvPr>
-            <p:ph type="ftr" sz="quarter" idx="12"/>
-          </p:nvPr>
-        </p:nvSpPr>
-        <p:spPr/>
-        <p:txBody>
-          <a:bodyPr/>
-          <a:lstStyle/>
-          <a:p>
-            <a:r>
-              <a:rPr lang="en-US" dirty="0"/>
-              <a:t>Victor Matheke | Bachelor‘s Thesis | Algorithmic Subdivision of Gamespaces</a:t>
-            </a:r>
-          </a:p>
-        </p:txBody>
-      </p:sp>
-      <p:sp>
-        <p:nvSpPr>
-          <p:cNvPr id="3" name="Titel 2">
-            <a:extLst>
-              <a:ext uri="{FF2B5EF4-FFF2-40B4-BE49-F238E27FC236}">
-                <a16:creationId xmlns:a16="http://schemas.microsoft.com/office/drawing/2014/main" id="{199A23C9-3CF5-E225-D99D-3B15BD785954}"/>
-              </a:ext>
-            </a:extLst>
-          </p:cNvPr>
-          <p:cNvSpPr>
-            <a:spLocks noGrp="1"/>
-          </p:cNvSpPr>
-          <p:nvPr>
-            <p:ph type="title"/>
-          </p:nvPr>
-        </p:nvSpPr>
-        <p:spPr>
-          <a:prstGeom prst="rect">
-            <a:avLst/>
-          </a:prstGeom>
-        </p:spPr>
-        <p:txBody>
-          <a:bodyPr/>
-          <a:lstStyle/>
-          <a:p>
-            <a:r>
-              <a:rPr lang="en-US" sz="3000" dirty="0"/>
-              <a:t>Assessment</a:t>
-            </a:r>
-          </a:p>
-        </p:txBody>
-      </p:sp>
-    </p:spTree>
-    <p:extLst>
-      <p:ext uri="{BB962C8B-B14F-4D97-AF65-F5344CB8AC3E}">
-        <p14:creationId xmlns:p14="http://schemas.microsoft.com/office/powerpoint/2010/main" val="3003218205"/>
       </p:ext>
     </p:extLst>
   </p:cSld>

</xml_diff>

<commit_message>
Added two images to the presentation.
</commit_message>
<xml_diff>
--- a/Presentation/Presentation.pptx
+++ b/Presentation/Presentation.pptx
@@ -10,10 +10,10 @@
     <p:sldMasterId id="2147483697" r:id="rId6"/>
   </p:sldMasterIdLst>
   <p:notesMasterIdLst>
-    <p:notesMasterId r:id="rId20"/>
+    <p:notesMasterId r:id="rId21"/>
   </p:notesMasterIdLst>
   <p:handoutMasterIdLst>
-    <p:handoutMasterId r:id="rId21"/>
+    <p:handoutMasterId r:id="rId22"/>
   </p:handoutMasterIdLst>
   <p:sldIdLst>
     <p:sldId id="356" r:id="rId7"/>
@@ -21,14 +21,15 @@
     <p:sldId id="370" r:id="rId9"/>
     <p:sldId id="381" r:id="rId10"/>
     <p:sldId id="371" r:id="rId11"/>
-    <p:sldId id="374" r:id="rId12"/>
-    <p:sldId id="373" r:id="rId13"/>
-    <p:sldId id="375" r:id="rId14"/>
-    <p:sldId id="376" r:id="rId15"/>
-    <p:sldId id="378" r:id="rId16"/>
-    <p:sldId id="380" r:id="rId17"/>
-    <p:sldId id="379" r:id="rId18"/>
-    <p:sldId id="377" r:id="rId19"/>
+    <p:sldId id="382" r:id="rId12"/>
+    <p:sldId id="374" r:id="rId13"/>
+    <p:sldId id="373" r:id="rId14"/>
+    <p:sldId id="375" r:id="rId15"/>
+    <p:sldId id="376" r:id="rId16"/>
+    <p:sldId id="378" r:id="rId17"/>
+    <p:sldId id="380" r:id="rId18"/>
+    <p:sldId id="379" r:id="rId19"/>
+    <p:sldId id="377" r:id="rId20"/>
   </p:sldIdLst>
   <p:sldSz cx="9144000" cy="6858000" type="screen4x3"/>
   <p:notesSz cx="9925050" cy="6665913"/>
@@ -9082,6 +9083,198 @@
         <p:cNvPr id="1" name="">
           <a:extLst>
             <a:ext uri="{FF2B5EF4-FFF2-40B4-BE49-F238E27FC236}">
+              <a16:creationId xmlns:a16="http://schemas.microsoft.com/office/drawing/2014/main" id="{8357CB39-D528-E029-36B0-9732CF59A5B4}"/>
+            </a:ext>
+          </a:extLst>
+        </p:cNvPr>
+        <p:cNvGrpSpPr/>
+        <p:nvPr/>
+      </p:nvGrpSpPr>
+      <p:grpSpPr>
+        <a:xfrm>
+          <a:off x="0" y="0"/>
+          <a:ext cx="0" cy="0"/>
+          <a:chOff x="0" y="0"/>
+          <a:chExt cx="0" cy="0"/>
+        </a:xfrm>
+      </p:grpSpPr>
+      <p:sp>
+        <p:nvSpPr>
+          <p:cNvPr id="2" name="Inhaltsplatzhalter 1">
+            <a:extLst>
+              <a:ext uri="{FF2B5EF4-FFF2-40B4-BE49-F238E27FC236}">
+                <a16:creationId xmlns:a16="http://schemas.microsoft.com/office/drawing/2014/main" id="{EE1997E0-7925-48BC-6E11-3780B048F8B4}"/>
+              </a:ext>
+            </a:extLst>
+          </p:cNvPr>
+          <p:cNvSpPr>
+            <a:spLocks noGrp="1"/>
+          </p:cNvSpPr>
+          <p:nvPr>
+            <p:ph idx="1"/>
+          </p:nvPr>
+        </p:nvSpPr>
+        <p:spPr/>
+        <p:txBody>
+          <a:bodyPr/>
+          <a:lstStyle/>
+          <a:p>
+            <a:pPr marL="285750" indent="-285750">
+              <a:buFont typeface="Arial" panose="020B0604020202020204" pitchFamily="34" charset="0"/>
+              <a:buChar char="•"/>
+            </a:pPr>
+            <a:r>
+              <a:rPr lang="en-US" dirty="0"/>
+              <a:t>Find the volume containing the point of interest:</a:t>
+            </a:r>
+          </a:p>
+          <a:p>
+            <a:pPr marL="519113" lvl="1" indent="-342900">
+              <a:buFont typeface="+mj-lt"/>
+              <a:buAutoNum type="arabicPeriod"/>
+            </a:pPr>
+            <a:r>
+              <a:rPr lang="en-US" dirty="0"/>
+              <a:t>Iterate over all anchors in the world</a:t>
+            </a:r>
+          </a:p>
+          <a:p>
+            <a:pPr marL="519113" lvl="1" indent="-342900">
+              <a:buFont typeface="+mj-lt"/>
+              <a:buAutoNum type="arabicPeriod"/>
+            </a:pPr>
+            <a:r>
+              <a:rPr lang="en-US" dirty="0"/>
+              <a:t>If the anchor‘s volume encloses the point =&gt; return the anchor‘s ID</a:t>
+            </a:r>
+          </a:p>
+          <a:p>
+            <a:pPr marL="285750" indent="-285750">
+              <a:buFont typeface="Arial" panose="020B0604020202020204" pitchFamily="34" charset="0"/>
+              <a:buChar char="•"/>
+            </a:pPr>
+            <a:endParaRPr lang="de-DE" dirty="0"/>
+          </a:p>
+          <a:p>
+            <a:pPr marL="285750" indent="-285750">
+              <a:buFont typeface="Arial" panose="020B0604020202020204" pitchFamily="34" charset="0"/>
+              <a:buChar char="•"/>
+            </a:pPr>
+            <a:endParaRPr lang="en-US" dirty="0"/>
+          </a:p>
+        </p:txBody>
+      </p:sp>
+      <p:sp>
+        <p:nvSpPr>
+          <p:cNvPr id="4" name="Foliennummernplatzhalter 3">
+            <a:extLst>
+              <a:ext uri="{FF2B5EF4-FFF2-40B4-BE49-F238E27FC236}">
+                <a16:creationId xmlns:a16="http://schemas.microsoft.com/office/drawing/2014/main" id="{82E891C4-18D0-C686-6CCB-17876C33807A}"/>
+              </a:ext>
+            </a:extLst>
+          </p:cNvPr>
+          <p:cNvSpPr>
+            <a:spLocks noGrp="1"/>
+          </p:cNvSpPr>
+          <p:nvPr>
+            <p:ph type="sldNum" sz="quarter" idx="11"/>
+          </p:nvPr>
+        </p:nvSpPr>
+        <p:spPr/>
+        <p:txBody>
+          <a:bodyPr/>
+          <a:lstStyle/>
+          <a:p>
+            <a:fld id="{CE58CB1E-F828-4F11-99E0-327109AF9DA4}" type="slidenum">
+              <a:rPr lang="de-DE" smtClean="0"/>
+              <a:pPr/>
+              <a:t>10</a:t>
+            </a:fld>
+            <a:endParaRPr lang="de-DE" dirty="0"/>
+          </a:p>
+        </p:txBody>
+      </p:sp>
+      <p:sp>
+        <p:nvSpPr>
+          <p:cNvPr id="7" name="Fußzeilenplatzhalter 4">
+            <a:extLst>
+              <a:ext uri="{FF2B5EF4-FFF2-40B4-BE49-F238E27FC236}">
+                <a16:creationId xmlns:a16="http://schemas.microsoft.com/office/drawing/2014/main" id="{540FA8D9-2F59-634E-A1FF-6686BC8920E9}"/>
+              </a:ext>
+            </a:extLst>
+          </p:cNvPr>
+          <p:cNvSpPr>
+            <a:spLocks noGrp="1"/>
+          </p:cNvSpPr>
+          <p:nvPr>
+            <p:ph type="ftr" sz="quarter" idx="12"/>
+          </p:nvPr>
+        </p:nvSpPr>
+        <p:spPr/>
+        <p:txBody>
+          <a:bodyPr/>
+          <a:lstStyle/>
+          <a:p>
+            <a:r>
+              <a:rPr lang="en-US" dirty="0"/>
+              <a:t>Victor Matheke | Bachelor‘s Thesis | Algorithmic Subdivision of Gamespaces</a:t>
+            </a:r>
+          </a:p>
+        </p:txBody>
+      </p:sp>
+      <p:sp>
+        <p:nvSpPr>
+          <p:cNvPr id="3" name="Titel 2">
+            <a:extLst>
+              <a:ext uri="{FF2B5EF4-FFF2-40B4-BE49-F238E27FC236}">
+                <a16:creationId xmlns:a16="http://schemas.microsoft.com/office/drawing/2014/main" id="{4884601B-385F-D3F1-F239-5FCCC4303278}"/>
+              </a:ext>
+            </a:extLst>
+          </p:cNvPr>
+          <p:cNvSpPr>
+            <a:spLocks noGrp="1"/>
+          </p:cNvSpPr>
+          <p:nvPr>
+            <p:ph type="title"/>
+          </p:nvPr>
+        </p:nvSpPr>
+        <p:spPr>
+          <a:prstGeom prst="rect">
+            <a:avLst/>
+          </a:prstGeom>
+        </p:spPr>
+        <p:txBody>
+          <a:bodyPr/>
+          <a:lstStyle/>
+          <a:p>
+            <a:r>
+              <a:rPr lang="en-US" sz="3000" dirty="0"/>
+              <a:t>Runtime: Point Queries</a:t>
+            </a:r>
+          </a:p>
+        </p:txBody>
+      </p:sp>
+    </p:spTree>
+    <p:extLst>
+      <p:ext uri="{BB962C8B-B14F-4D97-AF65-F5344CB8AC3E}">
+        <p14:creationId xmlns:p14="http://schemas.microsoft.com/office/powerpoint/2010/main" val="2869699537"/>
+      </p:ext>
+    </p:extLst>
+  </p:cSld>
+  <p:clrMapOvr>
+    <a:masterClrMapping/>
+  </p:clrMapOvr>
+</p:sld>
+</file>
+
+<file path=ppt/slides/slide11.xml><?xml version="1.0" encoding="utf-8"?>
+<p:sld xmlns:a="http://schemas.openxmlformats.org/drawingml/2006/main" xmlns:r="http://schemas.openxmlformats.org/officeDocument/2006/relationships" xmlns:p="http://schemas.openxmlformats.org/presentationml/2006/main">
+  <p:cSld>
+    <p:spTree>
+      <p:nvGrpSpPr>
+        <p:cNvPr id="1" name="">
+          <a:extLst>
+            <a:ext uri="{FF2B5EF4-FFF2-40B4-BE49-F238E27FC236}">
               <a16:creationId xmlns:a16="http://schemas.microsoft.com/office/drawing/2014/main" id="{C574AF84-52E5-5394-2681-C8DEF2DE95B6}"/>
             </a:ext>
           </a:extLst>
@@ -9203,7 +9396,7 @@
             <a:fld id="{CE58CB1E-F828-4F11-99E0-327109AF9DA4}" type="slidenum">
               <a:rPr lang="de-DE" smtClean="0"/>
               <a:pPr/>
-              <a:t>10</a:t>
+              <a:t>11</a:t>
             </a:fld>
             <a:endParaRPr lang="de-DE" dirty="0"/>
           </a:p>
@@ -9282,7 +9475,7 @@
 </p:sld>
 </file>
 
-<file path=ppt/slides/slide11.xml><?xml version="1.0" encoding="utf-8"?>
+<file path=ppt/slides/slide12.xml><?xml version="1.0" encoding="utf-8"?>
 <p:sld xmlns:a="http://schemas.openxmlformats.org/drawingml/2006/main" xmlns:r="http://schemas.openxmlformats.org/officeDocument/2006/relationships" xmlns:p="http://schemas.openxmlformats.org/presentationml/2006/main">
   <p:cSld>
     <p:spTree>
@@ -9457,7 +9650,7 @@
             <a:fld id="{CE58CB1E-F828-4F11-99E0-327109AF9DA4}" type="slidenum">
               <a:rPr lang="de-DE" smtClean="0"/>
               <a:pPr/>
-              <a:t>11</a:t>
+              <a:t>12</a:t>
             </a:fld>
             <a:endParaRPr lang="de-DE" dirty="0"/>
           </a:p>
@@ -9536,7 +9729,7 @@
 </p:sld>
 </file>
 
-<file path=ppt/slides/slide12.xml><?xml version="1.0" encoding="utf-8"?>
+<file path=ppt/slides/slide13.xml><?xml version="1.0" encoding="utf-8"?>
 <p:sld xmlns:a="http://schemas.openxmlformats.org/drawingml/2006/main" xmlns:r="http://schemas.openxmlformats.org/officeDocument/2006/relationships" xmlns:p="http://schemas.openxmlformats.org/presentationml/2006/main">
   <p:cSld>
     <p:spTree>
@@ -9645,7 +9838,7 @@
             <a:fld id="{CE58CB1E-F828-4F11-99E0-327109AF9DA4}" type="slidenum">
               <a:rPr lang="de-DE" smtClean="0"/>
               <a:pPr/>
-              <a:t>12</a:t>
+              <a:t>13</a:t>
             </a:fld>
             <a:endParaRPr lang="de-DE" dirty="0"/>
           </a:p>
@@ -9724,7 +9917,7 @@
 </p:sld>
 </file>
 
-<file path=ppt/slides/slide13.xml><?xml version="1.0" encoding="utf-8"?>
+<file path=ppt/slides/slide14.xml><?xml version="1.0" encoding="utf-8"?>
 <p:sld xmlns:a="http://schemas.openxmlformats.org/drawingml/2006/main" xmlns:r="http://schemas.openxmlformats.org/officeDocument/2006/relationships" xmlns:p="http://schemas.openxmlformats.org/presentationml/2006/main">
   <p:cSld>
     <p:spTree>
@@ -9912,7 +10105,7 @@
             <a:fld id="{CE58CB1E-F828-4F11-99E0-327109AF9DA4}" type="slidenum">
               <a:rPr lang="de-DE" smtClean="0"/>
               <a:pPr/>
-              <a:t>13</a:t>
+              <a:t>14</a:t>
             </a:fld>
             <a:endParaRPr lang="de-DE" dirty="0"/>
           </a:p>
@@ -10818,11 +11011,41 @@
           <a:p>
             <a:r>
               <a:rPr lang="en-US" sz="3000" dirty="0"/>
-              <a:t>Desired Output</a:t>
-            </a:r>
-          </a:p>
-        </p:txBody>
-      </p:sp>
+              <a:t>Desired Output I</a:t>
+            </a:r>
+          </a:p>
+        </p:txBody>
+      </p:sp>
+      <p:pic>
+        <p:nvPicPr>
+          <p:cNvPr id="6" name="Picture 5">
+            <a:extLst>
+              <a:ext uri="{FF2B5EF4-FFF2-40B4-BE49-F238E27FC236}">
+                <a16:creationId xmlns:a16="http://schemas.microsoft.com/office/drawing/2014/main" id="{123821E1-A734-5712-372B-5640DA84D2A5}"/>
+              </a:ext>
+            </a:extLst>
+          </p:cNvPr>
+          <p:cNvPicPr>
+            <a:picLocks noChangeAspect="1"/>
+          </p:cNvPicPr>
+          <p:nvPr/>
+        </p:nvPicPr>
+        <p:blipFill>
+          <a:blip r:embed="rId2"/>
+          <a:stretch>
+            <a:fillRect/>
+          </a:stretch>
+        </p:blipFill>
+        <p:spPr>
+          <a:xfrm>
+            <a:off x="1037161" y="1601733"/>
+            <a:ext cx="7069678" cy="4860027"/>
+          </a:xfrm>
+          <a:prstGeom prst="rect">
+            <a:avLst/>
+          </a:prstGeom>
+        </p:spPr>
+      </p:pic>
     </p:spTree>
     <p:extLst>
       <p:ext uri="{BB962C8B-B14F-4D97-AF65-F5344CB8AC3E}">
@@ -10841,6 +11064,191 @@
   <p:cSld>
     <p:spTree>
       <p:nvGrpSpPr>
+        <p:cNvPr id="1" name="">
+          <a:extLst>
+            <a:ext uri="{FF2B5EF4-FFF2-40B4-BE49-F238E27FC236}">
+              <a16:creationId xmlns:a16="http://schemas.microsoft.com/office/drawing/2014/main" id="{2816A7B8-095D-4223-981F-9E35EDC57DCF}"/>
+            </a:ext>
+          </a:extLst>
+        </p:cNvPr>
+        <p:cNvGrpSpPr/>
+        <p:nvPr/>
+      </p:nvGrpSpPr>
+      <p:grpSpPr>
+        <a:xfrm>
+          <a:off x="0" y="0"/>
+          <a:ext cx="0" cy="0"/>
+          <a:chOff x="0" y="0"/>
+          <a:chExt cx="0" cy="0"/>
+        </a:xfrm>
+      </p:grpSpPr>
+      <p:sp>
+        <p:nvSpPr>
+          <p:cNvPr id="2" name="Inhaltsplatzhalter 1">
+            <a:extLst>
+              <a:ext uri="{FF2B5EF4-FFF2-40B4-BE49-F238E27FC236}">
+                <a16:creationId xmlns:a16="http://schemas.microsoft.com/office/drawing/2014/main" id="{4CD81A4E-BD49-95C5-3293-46F161F57889}"/>
+              </a:ext>
+            </a:extLst>
+          </p:cNvPr>
+          <p:cNvSpPr>
+            <a:spLocks noGrp="1"/>
+          </p:cNvSpPr>
+          <p:nvPr>
+            <p:ph idx="1"/>
+          </p:nvPr>
+        </p:nvSpPr>
+        <p:spPr/>
+        <p:txBody>
+          <a:bodyPr/>
+          <a:lstStyle/>
+          <a:p>
+            <a:pPr marL="285750" indent="-285750">
+              <a:buFont typeface="Arial" panose="020B0604020202020204" pitchFamily="34" charset="0"/>
+              <a:buChar char="•"/>
+            </a:pPr>
+            <a:endParaRPr lang="en-US" dirty="0"/>
+          </a:p>
+        </p:txBody>
+      </p:sp>
+      <p:sp>
+        <p:nvSpPr>
+          <p:cNvPr id="4" name="Foliennummernplatzhalter 3">
+            <a:extLst>
+              <a:ext uri="{FF2B5EF4-FFF2-40B4-BE49-F238E27FC236}">
+                <a16:creationId xmlns:a16="http://schemas.microsoft.com/office/drawing/2014/main" id="{23CBEF10-8A34-EE1A-A6D5-CB82050B6449}"/>
+              </a:ext>
+            </a:extLst>
+          </p:cNvPr>
+          <p:cNvSpPr>
+            <a:spLocks noGrp="1"/>
+          </p:cNvSpPr>
+          <p:nvPr>
+            <p:ph type="sldNum" sz="quarter" idx="11"/>
+          </p:nvPr>
+        </p:nvSpPr>
+        <p:spPr/>
+        <p:txBody>
+          <a:bodyPr/>
+          <a:lstStyle/>
+          <a:p>
+            <a:fld id="{CE58CB1E-F828-4F11-99E0-327109AF9DA4}" type="slidenum">
+              <a:rPr lang="de-DE" smtClean="0"/>
+              <a:pPr/>
+              <a:t>6</a:t>
+            </a:fld>
+            <a:endParaRPr lang="de-DE" dirty="0"/>
+          </a:p>
+        </p:txBody>
+      </p:sp>
+      <p:sp>
+        <p:nvSpPr>
+          <p:cNvPr id="7" name="Fußzeilenplatzhalter 4">
+            <a:extLst>
+              <a:ext uri="{FF2B5EF4-FFF2-40B4-BE49-F238E27FC236}">
+                <a16:creationId xmlns:a16="http://schemas.microsoft.com/office/drawing/2014/main" id="{49448C60-390E-41A5-F49E-8EA91A0E5AAC}"/>
+              </a:ext>
+            </a:extLst>
+          </p:cNvPr>
+          <p:cNvSpPr>
+            <a:spLocks noGrp="1"/>
+          </p:cNvSpPr>
+          <p:nvPr>
+            <p:ph type="ftr" sz="quarter" idx="12"/>
+          </p:nvPr>
+        </p:nvSpPr>
+        <p:spPr/>
+        <p:txBody>
+          <a:bodyPr/>
+          <a:lstStyle/>
+          <a:p>
+            <a:r>
+              <a:rPr lang="en-US" dirty="0"/>
+              <a:t>Victor Matheke | Bachelor‘s Thesis | Algorithmic Subdivision of Gamespaces</a:t>
+            </a:r>
+          </a:p>
+        </p:txBody>
+      </p:sp>
+      <p:sp>
+        <p:nvSpPr>
+          <p:cNvPr id="3" name="Titel 2">
+            <a:extLst>
+              <a:ext uri="{FF2B5EF4-FFF2-40B4-BE49-F238E27FC236}">
+                <a16:creationId xmlns:a16="http://schemas.microsoft.com/office/drawing/2014/main" id="{61D8E892-2088-4D4E-B98C-82A84D5C36E0}"/>
+              </a:ext>
+            </a:extLst>
+          </p:cNvPr>
+          <p:cNvSpPr>
+            <a:spLocks noGrp="1"/>
+          </p:cNvSpPr>
+          <p:nvPr>
+            <p:ph type="title"/>
+          </p:nvPr>
+        </p:nvSpPr>
+        <p:spPr>
+          <a:prstGeom prst="rect">
+            <a:avLst/>
+          </a:prstGeom>
+        </p:spPr>
+        <p:txBody>
+          <a:bodyPr/>
+          <a:lstStyle/>
+          <a:p>
+            <a:r>
+              <a:rPr lang="en-US" sz="3000" dirty="0"/>
+              <a:t>Desired Output II</a:t>
+            </a:r>
+          </a:p>
+        </p:txBody>
+      </p:sp>
+      <p:pic>
+        <p:nvPicPr>
+          <p:cNvPr id="6" name="Picture 5">
+            <a:extLst>
+              <a:ext uri="{FF2B5EF4-FFF2-40B4-BE49-F238E27FC236}">
+                <a16:creationId xmlns:a16="http://schemas.microsoft.com/office/drawing/2014/main" id="{1C894B10-E945-BFAD-D07E-5D078D4914AD}"/>
+              </a:ext>
+            </a:extLst>
+          </p:cNvPr>
+          <p:cNvPicPr>
+            <a:picLocks noChangeAspect="1"/>
+          </p:cNvPicPr>
+          <p:nvPr/>
+        </p:nvPicPr>
+        <p:blipFill>
+          <a:blip r:embed="rId2"/>
+          <a:stretch>
+            <a:fillRect/>
+          </a:stretch>
+        </p:blipFill>
+        <p:spPr>
+          <a:xfrm>
+            <a:off x="677977" y="1573089"/>
+            <a:ext cx="7788046" cy="4900224"/>
+          </a:xfrm>
+          <a:prstGeom prst="rect">
+            <a:avLst/>
+          </a:prstGeom>
+        </p:spPr>
+      </p:pic>
+    </p:spTree>
+    <p:extLst>
+      <p:ext uri="{BB962C8B-B14F-4D97-AF65-F5344CB8AC3E}">
+        <p14:creationId xmlns:p14="http://schemas.microsoft.com/office/powerpoint/2010/main" val="3723344391"/>
+      </p:ext>
+    </p:extLst>
+  </p:cSld>
+  <p:clrMapOvr>
+    <a:masterClrMapping/>
+  </p:clrMapOvr>
+</p:sld>
+</file>
+
+<file path=ppt/slides/slide7.xml><?xml version="1.0" encoding="utf-8"?>
+<p:sld xmlns:a="http://schemas.openxmlformats.org/drawingml/2006/main" xmlns:r="http://schemas.openxmlformats.org/officeDocument/2006/relationships" xmlns:p="http://schemas.openxmlformats.org/presentationml/2006/main">
+  <p:cSld>
+    <p:spTree>
+      <p:nvGrpSpPr>
         <p:cNvPr id="1" name=""/>
         <p:cNvGrpSpPr/>
         <p:nvPr/>
@@ -11091,7 +11499,7 @@
             <a:fld id="{CE58CB1E-F828-4F11-99E0-327109AF9DA4}" type="slidenum">
               <a:rPr lang="de-DE" smtClean="0"/>
               <a:pPr/>
-              <a:t>6</a:t>
+              <a:t>7</a:t>
             </a:fld>
             <a:endParaRPr lang="de-DE" dirty="0"/>
           </a:p>
@@ -11167,7 +11575,7 @@
 </p:sld>
 </file>
 
-<file path=ppt/slides/slide7.xml><?xml version="1.0" encoding="utf-8"?>
+<file path=ppt/slides/slide8.xml><?xml version="1.0" encoding="utf-8"?>
 <p:sld xmlns:a="http://schemas.openxmlformats.org/drawingml/2006/main" xmlns:r="http://schemas.openxmlformats.org/officeDocument/2006/relationships" xmlns:p="http://schemas.openxmlformats.org/presentationml/2006/main">
   <p:cSld>
     <p:spTree>
@@ -11287,7 +11695,7 @@
             <a:fld id="{CE58CB1E-F828-4F11-99E0-327109AF9DA4}" type="slidenum">
               <a:rPr lang="de-DE" smtClean="0"/>
               <a:pPr/>
-              <a:t>7</a:t>
+              <a:t>8</a:t>
             </a:fld>
             <a:endParaRPr lang="de-DE" dirty="0"/>
           </a:p>
@@ -11396,7 +11804,7 @@
 </p:sld>
 </file>
 
-<file path=ppt/slides/slide8.xml><?xml version="1.0" encoding="utf-8"?>
+<file path=ppt/slides/slide9.xml><?xml version="1.0" encoding="utf-8"?>
 <p:sld xmlns:a="http://schemas.openxmlformats.org/drawingml/2006/main" xmlns:r="http://schemas.openxmlformats.org/officeDocument/2006/relationships" xmlns:p="http://schemas.openxmlformats.org/presentationml/2006/main">
   <p:cSld>
     <p:spTree>
@@ -11548,7 +11956,7 @@
             <a:fld id="{CE58CB1E-F828-4F11-99E0-327109AF9DA4}" type="slidenum">
               <a:rPr lang="de-DE" smtClean="0"/>
               <a:pPr/>
-              <a:t>8</a:t>
+              <a:t>9</a:t>
             </a:fld>
             <a:endParaRPr lang="de-DE" dirty="0"/>
           </a:p>
@@ -11618,198 +12026,6 @@
     <p:extLst>
       <p:ext uri="{BB962C8B-B14F-4D97-AF65-F5344CB8AC3E}">
         <p14:creationId xmlns:p14="http://schemas.microsoft.com/office/powerpoint/2010/main" val="140102510"/>
-      </p:ext>
-    </p:extLst>
-  </p:cSld>
-  <p:clrMapOvr>
-    <a:masterClrMapping/>
-  </p:clrMapOvr>
-</p:sld>
-</file>
-
-<file path=ppt/slides/slide9.xml><?xml version="1.0" encoding="utf-8"?>
-<p:sld xmlns:a="http://schemas.openxmlformats.org/drawingml/2006/main" xmlns:r="http://schemas.openxmlformats.org/officeDocument/2006/relationships" xmlns:p="http://schemas.openxmlformats.org/presentationml/2006/main">
-  <p:cSld>
-    <p:spTree>
-      <p:nvGrpSpPr>
-        <p:cNvPr id="1" name="">
-          <a:extLst>
-            <a:ext uri="{FF2B5EF4-FFF2-40B4-BE49-F238E27FC236}">
-              <a16:creationId xmlns:a16="http://schemas.microsoft.com/office/drawing/2014/main" id="{8357CB39-D528-E029-36B0-9732CF59A5B4}"/>
-            </a:ext>
-          </a:extLst>
-        </p:cNvPr>
-        <p:cNvGrpSpPr/>
-        <p:nvPr/>
-      </p:nvGrpSpPr>
-      <p:grpSpPr>
-        <a:xfrm>
-          <a:off x="0" y="0"/>
-          <a:ext cx="0" cy="0"/>
-          <a:chOff x="0" y="0"/>
-          <a:chExt cx="0" cy="0"/>
-        </a:xfrm>
-      </p:grpSpPr>
-      <p:sp>
-        <p:nvSpPr>
-          <p:cNvPr id="2" name="Inhaltsplatzhalter 1">
-            <a:extLst>
-              <a:ext uri="{FF2B5EF4-FFF2-40B4-BE49-F238E27FC236}">
-                <a16:creationId xmlns:a16="http://schemas.microsoft.com/office/drawing/2014/main" id="{EE1997E0-7925-48BC-6E11-3780B048F8B4}"/>
-              </a:ext>
-            </a:extLst>
-          </p:cNvPr>
-          <p:cNvSpPr>
-            <a:spLocks noGrp="1"/>
-          </p:cNvSpPr>
-          <p:nvPr>
-            <p:ph idx="1"/>
-          </p:nvPr>
-        </p:nvSpPr>
-        <p:spPr/>
-        <p:txBody>
-          <a:bodyPr/>
-          <a:lstStyle/>
-          <a:p>
-            <a:pPr marL="285750" indent="-285750">
-              <a:buFont typeface="Arial" panose="020B0604020202020204" pitchFamily="34" charset="0"/>
-              <a:buChar char="•"/>
-            </a:pPr>
-            <a:r>
-              <a:rPr lang="en-US" dirty="0"/>
-              <a:t>Find the volume containing the point of interest:</a:t>
-            </a:r>
-          </a:p>
-          <a:p>
-            <a:pPr marL="519113" lvl="1" indent="-342900">
-              <a:buFont typeface="+mj-lt"/>
-              <a:buAutoNum type="arabicPeriod"/>
-            </a:pPr>
-            <a:r>
-              <a:rPr lang="en-US" dirty="0"/>
-              <a:t>Iterate over all anchors in the world</a:t>
-            </a:r>
-          </a:p>
-          <a:p>
-            <a:pPr marL="519113" lvl="1" indent="-342900">
-              <a:buFont typeface="+mj-lt"/>
-              <a:buAutoNum type="arabicPeriod"/>
-            </a:pPr>
-            <a:r>
-              <a:rPr lang="en-US" dirty="0"/>
-              <a:t>If the anchor‘s volume encloses the point =&gt; return the anchor‘s ID</a:t>
-            </a:r>
-          </a:p>
-          <a:p>
-            <a:pPr marL="285750" indent="-285750">
-              <a:buFont typeface="Arial" panose="020B0604020202020204" pitchFamily="34" charset="0"/>
-              <a:buChar char="•"/>
-            </a:pPr>
-            <a:endParaRPr lang="de-DE" dirty="0"/>
-          </a:p>
-          <a:p>
-            <a:pPr marL="285750" indent="-285750">
-              <a:buFont typeface="Arial" panose="020B0604020202020204" pitchFamily="34" charset="0"/>
-              <a:buChar char="•"/>
-            </a:pPr>
-            <a:endParaRPr lang="en-US" dirty="0"/>
-          </a:p>
-        </p:txBody>
-      </p:sp>
-      <p:sp>
-        <p:nvSpPr>
-          <p:cNvPr id="4" name="Foliennummernplatzhalter 3">
-            <a:extLst>
-              <a:ext uri="{FF2B5EF4-FFF2-40B4-BE49-F238E27FC236}">
-                <a16:creationId xmlns:a16="http://schemas.microsoft.com/office/drawing/2014/main" id="{82E891C4-18D0-C686-6CCB-17876C33807A}"/>
-              </a:ext>
-            </a:extLst>
-          </p:cNvPr>
-          <p:cNvSpPr>
-            <a:spLocks noGrp="1"/>
-          </p:cNvSpPr>
-          <p:nvPr>
-            <p:ph type="sldNum" sz="quarter" idx="11"/>
-          </p:nvPr>
-        </p:nvSpPr>
-        <p:spPr/>
-        <p:txBody>
-          <a:bodyPr/>
-          <a:lstStyle/>
-          <a:p>
-            <a:fld id="{CE58CB1E-F828-4F11-99E0-327109AF9DA4}" type="slidenum">
-              <a:rPr lang="de-DE" smtClean="0"/>
-              <a:pPr/>
-              <a:t>9</a:t>
-            </a:fld>
-            <a:endParaRPr lang="de-DE" dirty="0"/>
-          </a:p>
-        </p:txBody>
-      </p:sp>
-      <p:sp>
-        <p:nvSpPr>
-          <p:cNvPr id="7" name="Fußzeilenplatzhalter 4">
-            <a:extLst>
-              <a:ext uri="{FF2B5EF4-FFF2-40B4-BE49-F238E27FC236}">
-                <a16:creationId xmlns:a16="http://schemas.microsoft.com/office/drawing/2014/main" id="{540FA8D9-2F59-634E-A1FF-6686BC8920E9}"/>
-              </a:ext>
-            </a:extLst>
-          </p:cNvPr>
-          <p:cNvSpPr>
-            <a:spLocks noGrp="1"/>
-          </p:cNvSpPr>
-          <p:nvPr>
-            <p:ph type="ftr" sz="quarter" idx="12"/>
-          </p:nvPr>
-        </p:nvSpPr>
-        <p:spPr/>
-        <p:txBody>
-          <a:bodyPr/>
-          <a:lstStyle/>
-          <a:p>
-            <a:r>
-              <a:rPr lang="en-US" dirty="0"/>
-              <a:t>Victor Matheke | Bachelor‘s Thesis | Algorithmic Subdivision of Gamespaces</a:t>
-            </a:r>
-          </a:p>
-        </p:txBody>
-      </p:sp>
-      <p:sp>
-        <p:nvSpPr>
-          <p:cNvPr id="3" name="Titel 2">
-            <a:extLst>
-              <a:ext uri="{FF2B5EF4-FFF2-40B4-BE49-F238E27FC236}">
-                <a16:creationId xmlns:a16="http://schemas.microsoft.com/office/drawing/2014/main" id="{4884601B-385F-D3F1-F239-5FCCC4303278}"/>
-              </a:ext>
-            </a:extLst>
-          </p:cNvPr>
-          <p:cNvSpPr>
-            <a:spLocks noGrp="1"/>
-          </p:cNvSpPr>
-          <p:nvPr>
-            <p:ph type="title"/>
-          </p:nvPr>
-        </p:nvSpPr>
-        <p:spPr>
-          <a:prstGeom prst="rect">
-            <a:avLst/>
-          </a:prstGeom>
-        </p:spPr>
-        <p:txBody>
-          <a:bodyPr/>
-          <a:lstStyle/>
-          <a:p>
-            <a:r>
-              <a:rPr lang="en-US" sz="3000" dirty="0"/>
-              <a:t>Runtime: Point Queries</a:t>
-            </a:r>
-          </a:p>
-        </p:txBody>
-      </p:sp>
-    </p:spTree>
-    <p:extLst>
-      <p:ext uri="{BB962C8B-B14F-4D97-AF65-F5344CB8AC3E}">
-        <p14:creationId xmlns:p14="http://schemas.microsoft.com/office/powerpoint/2010/main" val="2869699537"/>
       </p:ext>
     </p:extLst>
   </p:cSld>

</xml_diff>

<commit_message>
One last-minute to add the supervisor to the presentation frontpage.
</commit_message>
<xml_diff>
--- a/Presentation/Presentation.pptx
+++ b/Presentation/Presentation.pptx
@@ -300,7 +300,7 @@
               <a:pPr>
                 <a:defRPr/>
               </a:pPr>
-              <a:t>20/10/2024</a:t>
+              <a:t>24/10/2024</a:t>
             </a:fld>
             <a:endParaRPr lang="en-GB" dirty="0"/>
           </a:p>
@@ -519,7 +519,7 @@
               <a:pPr>
                 <a:defRPr/>
               </a:pPr>
-              <a:t>20/10/2024</a:t>
+              <a:t>24/10/2024</a:t>
             </a:fld>
             <a:endParaRPr lang="en-GB"/>
           </a:p>
@@ -9063,6 +9063,29 @@
             <a:r>
               <a:rPr lang="de-DE" dirty="0"/>
               <a:t>München, 24. Oktober 2024</a:t>
+            </a:r>
+          </a:p>
+          <a:p>
+            <a:endParaRPr lang="de-DE" dirty="0"/>
+          </a:p>
+          <a:p>
+            <a:r>
+              <a:rPr lang="de-DE" dirty="0"/>
+              <a:t>Final: </a:t>
+            </a:r>
+            <a:r>
+              <a:rPr lang="de-DE" dirty="0" err="1"/>
+              <a:t>B.Sc</a:t>
+            </a:r>
+            <a:r>
+              <a:rPr lang="de-DE" dirty="0"/>
+              <a:t>: Informatik: Games Engineering</a:t>
+            </a:r>
+          </a:p>
+          <a:p>
+            <a:r>
+              <a:rPr lang="de-DE" dirty="0"/>
+              <a:t>Supervisor: Prof. Dr. rer. nat. David Plecher</a:t>
             </a:r>
           </a:p>
         </p:txBody>

</xml_diff>